<commit_message>
open-ended cluster analysis with black respondants only
</commit_message>
<xml_diff>
--- a/_site/mediation.pptx
+++ b/_site/mediation.pptx
@@ -218,7 +218,7 @@
           <a:p>
             <a:fld id="{5DE78A1B-AECA-E64A-9489-61D5B0D20729}" type="datetimeFigureOut">
               <a:rPr lang="en-US" smtClean="0"/>
-              <a:t>8/4/20</a:t>
+              <a:t>8/7/20</a:t>
             </a:fld>
             <a:endParaRPr lang="en-US"/>
           </a:p>
@@ -1220,7 +1220,7 @@
           <a:p>
             <a:fld id="{8E7D92A5-D5EC-824D-9F15-8899D1395F44}" type="datetimeFigureOut">
               <a:rPr lang="en-US" smtClean="0"/>
-              <a:t>8/4/20</a:t>
+              <a:t>8/7/20</a:t>
             </a:fld>
             <a:endParaRPr lang="en-US"/>
           </a:p>
@@ -1418,7 +1418,7 @@
           <a:p>
             <a:fld id="{8E7D92A5-D5EC-824D-9F15-8899D1395F44}" type="datetimeFigureOut">
               <a:rPr lang="en-US" smtClean="0"/>
-              <a:t>8/4/20</a:t>
+              <a:t>8/7/20</a:t>
             </a:fld>
             <a:endParaRPr lang="en-US"/>
           </a:p>
@@ -1626,7 +1626,7 @@
           <a:p>
             <a:fld id="{8E7D92A5-D5EC-824D-9F15-8899D1395F44}" type="datetimeFigureOut">
               <a:rPr lang="en-US" smtClean="0"/>
-              <a:t>8/4/20</a:t>
+              <a:t>8/7/20</a:t>
             </a:fld>
             <a:endParaRPr lang="en-US"/>
           </a:p>
@@ -1824,7 +1824,7 @@
           <a:p>
             <a:fld id="{8E7D92A5-D5EC-824D-9F15-8899D1395F44}" type="datetimeFigureOut">
               <a:rPr lang="en-US" smtClean="0"/>
-              <a:t>8/4/20</a:t>
+              <a:t>8/7/20</a:t>
             </a:fld>
             <a:endParaRPr lang="en-US"/>
           </a:p>
@@ -2099,7 +2099,7 @@
           <a:p>
             <a:fld id="{8E7D92A5-D5EC-824D-9F15-8899D1395F44}" type="datetimeFigureOut">
               <a:rPr lang="en-US" smtClean="0"/>
-              <a:t>8/4/20</a:t>
+              <a:t>8/7/20</a:t>
             </a:fld>
             <a:endParaRPr lang="en-US"/>
           </a:p>
@@ -2364,7 +2364,7 @@
           <a:p>
             <a:fld id="{8E7D92A5-D5EC-824D-9F15-8899D1395F44}" type="datetimeFigureOut">
               <a:rPr lang="en-US" smtClean="0"/>
-              <a:t>8/4/20</a:t>
+              <a:t>8/7/20</a:t>
             </a:fld>
             <a:endParaRPr lang="en-US"/>
           </a:p>
@@ -2776,7 +2776,7 @@
           <a:p>
             <a:fld id="{8E7D92A5-D5EC-824D-9F15-8899D1395F44}" type="datetimeFigureOut">
               <a:rPr lang="en-US" smtClean="0"/>
-              <a:t>8/4/20</a:t>
+              <a:t>8/7/20</a:t>
             </a:fld>
             <a:endParaRPr lang="en-US"/>
           </a:p>
@@ -2917,7 +2917,7 @@
           <a:p>
             <a:fld id="{8E7D92A5-D5EC-824D-9F15-8899D1395F44}" type="datetimeFigureOut">
               <a:rPr lang="en-US" smtClean="0"/>
-              <a:t>8/4/20</a:t>
+              <a:t>8/7/20</a:t>
             </a:fld>
             <a:endParaRPr lang="en-US"/>
           </a:p>
@@ -3030,7 +3030,7 @@
           <a:p>
             <a:fld id="{8E7D92A5-D5EC-824D-9F15-8899D1395F44}" type="datetimeFigureOut">
               <a:rPr lang="en-US" smtClean="0"/>
-              <a:t>8/4/20</a:t>
+              <a:t>8/7/20</a:t>
             </a:fld>
             <a:endParaRPr lang="en-US"/>
           </a:p>
@@ -3341,7 +3341,7 @@
           <a:p>
             <a:fld id="{8E7D92A5-D5EC-824D-9F15-8899D1395F44}" type="datetimeFigureOut">
               <a:rPr lang="en-US" smtClean="0"/>
-              <a:t>8/4/20</a:t>
+              <a:t>8/7/20</a:t>
             </a:fld>
             <a:endParaRPr lang="en-US"/>
           </a:p>
@@ -3629,7 +3629,7 @@
           <a:p>
             <a:fld id="{8E7D92A5-D5EC-824D-9F15-8899D1395F44}" type="datetimeFigureOut">
               <a:rPr lang="en-US" smtClean="0"/>
-              <a:t>8/4/20</a:t>
+              <a:t>8/7/20</a:t>
             </a:fld>
             <a:endParaRPr lang="en-US"/>
           </a:p>
@@ -3870,7 +3870,7 @@
           <a:p>
             <a:fld id="{8E7D92A5-D5EC-824D-9F15-8899D1395F44}" type="datetimeFigureOut">
               <a:rPr lang="en-US" smtClean="0"/>
-              <a:t>8/4/20</a:t>
+              <a:t>8/7/20</a:t>
             </a:fld>
             <a:endParaRPr lang="en-US"/>
           </a:p>
@@ -4345,15 +4345,7 @@
             <a:pPr lvl="1"/>
             <a:r>
               <a:rPr lang="en-US" dirty="0"/>
-              <a:t>Parameters </a:t>
-            </a:r>
-            <a:r>
-              <a:rPr lang="en-US" dirty="0" err="1"/>
-              <a:t>constrainted</a:t>
-            </a:r>
-            <a:r>
-              <a:rPr lang="en-US" dirty="0"/>
-              <a:t> to be equivalent across time </a:t>
+              <a:t>Parameters constrained to be equivalent across time </a:t>
             </a:r>
           </a:p>
           <a:p>

</xml_diff>